<commit_message>
Fixed minor typos in the examples, added more in Presentation
</commit_message>
<xml_diff>
--- a/Presentation.pptx
+++ b/Presentation.pptx
@@ -109,6 +109,11 @@
       </a:defRPr>
     </a:lvl9pPr>
   </p:defaultTextStyle>
+  <p:extLst>
+    <p:ext uri="{EFAFB233-063F-42B5-8137-9DF3F51BA10A}">
+      <p15:sldGuideLst xmlns:p15="http://schemas.microsoft.com/office/powerpoint/2012/main"/>
+    </p:ext>
+  </p:extLst>
 </p:presentation>
 </file>
 
@@ -297,7 +302,7 @@
           <a:p>
             <a:fld id="{7C5B5309-B0EA-4A94-B044-96E204895EB9}" type="datetimeFigureOut">
               <a:rPr lang="en-US" smtClean="0"/>
-              <a:t>4/12/2022</a:t>
+              <a:t>4/14/2022</a:t>
             </a:fld>
             <a:endParaRPr lang="en-US"/>
           </a:p>
@@ -595,7 +600,7 @@
           <a:p>
             <a:fld id="{7C5B5309-B0EA-4A94-B044-96E204895EB9}" type="datetimeFigureOut">
               <a:rPr lang="en-US" smtClean="0"/>
-              <a:t>4/12/2022</a:t>
+              <a:t>4/14/2022</a:t>
             </a:fld>
             <a:endParaRPr lang="en-US"/>
           </a:p>
@@ -787,7 +792,7 @@
           <a:p>
             <a:fld id="{7C5B5309-B0EA-4A94-B044-96E204895EB9}" type="datetimeFigureOut">
               <a:rPr lang="en-US" smtClean="0"/>
-              <a:t>4/12/2022</a:t>
+              <a:t>4/14/2022</a:t>
             </a:fld>
             <a:endParaRPr lang="en-US"/>
           </a:p>
@@ -1048,7 +1053,7 @@
           <a:p>
             <a:fld id="{7C5B5309-B0EA-4A94-B044-96E204895EB9}" type="datetimeFigureOut">
               <a:rPr lang="en-US" smtClean="0"/>
-              <a:t>4/12/2022</a:t>
+              <a:t>4/14/2022</a:t>
             </a:fld>
             <a:endParaRPr lang="en-US"/>
           </a:p>
@@ -1472,7 +1477,7 @@
           <a:p>
             <a:fld id="{7C5B5309-B0EA-4A94-B044-96E204895EB9}" type="datetimeFigureOut">
               <a:rPr lang="en-US" smtClean="0"/>
-              <a:t>4/12/2022</a:t>
+              <a:t>4/14/2022</a:t>
             </a:fld>
             <a:endParaRPr lang="en-US"/>
           </a:p>
@@ -2009,7 +2014,7 @@
           <a:p>
             <a:fld id="{7C5B5309-B0EA-4A94-B044-96E204895EB9}" type="datetimeFigureOut">
               <a:rPr lang="en-US" smtClean="0"/>
-              <a:t>4/12/2022</a:t>
+              <a:t>4/14/2022</a:t>
             </a:fld>
             <a:endParaRPr lang="en-US"/>
           </a:p>
@@ -2873,7 +2878,7 @@
           <a:p>
             <a:fld id="{7C5B5309-B0EA-4A94-B044-96E204895EB9}" type="datetimeFigureOut">
               <a:rPr lang="en-US" smtClean="0"/>
-              <a:t>4/12/2022</a:t>
+              <a:t>4/14/2022</a:t>
             </a:fld>
             <a:endParaRPr lang="en-US"/>
           </a:p>
@@ -3043,7 +3048,7 @@
           <a:p>
             <a:fld id="{7C5B5309-B0EA-4A94-B044-96E204895EB9}" type="datetimeFigureOut">
               <a:rPr lang="en-US" smtClean="0"/>
-              <a:t>4/12/2022</a:t>
+              <a:t>4/14/2022</a:t>
             </a:fld>
             <a:endParaRPr lang="en-US"/>
           </a:p>
@@ -3227,7 +3232,7 @@
           <a:p>
             <a:fld id="{7C5B5309-B0EA-4A94-B044-96E204895EB9}" type="datetimeFigureOut">
               <a:rPr lang="en-US" smtClean="0"/>
-              <a:t>4/12/2022</a:t>
+              <a:t>4/14/2022</a:t>
             </a:fld>
             <a:endParaRPr lang="en-US"/>
           </a:p>
@@ -3397,7 +3402,7 @@
           <a:p>
             <a:fld id="{7C5B5309-B0EA-4A94-B044-96E204895EB9}" type="datetimeFigureOut">
               <a:rPr lang="en-US" smtClean="0"/>
-              <a:t>4/12/2022</a:t>
+              <a:t>4/14/2022</a:t>
             </a:fld>
             <a:endParaRPr lang="en-US"/>
           </a:p>
@@ -3641,7 +3646,7 @@
           <a:p>
             <a:fld id="{7C5B5309-B0EA-4A94-B044-96E204895EB9}" type="datetimeFigureOut">
               <a:rPr lang="en-US" smtClean="0"/>
-              <a:t>4/12/2022</a:t>
+              <a:t>4/14/2022</a:t>
             </a:fld>
             <a:endParaRPr lang="en-US"/>
           </a:p>
@@ -3877,7 +3882,7 @@
           <a:p>
             <a:fld id="{7C5B5309-B0EA-4A94-B044-96E204895EB9}" type="datetimeFigureOut">
               <a:rPr lang="en-US" smtClean="0"/>
-              <a:t>4/12/2022</a:t>
+              <a:t>4/14/2022</a:t>
             </a:fld>
             <a:endParaRPr lang="en-US"/>
           </a:p>
@@ -4343,7 +4348,7 @@
           <a:p>
             <a:fld id="{7C5B5309-B0EA-4A94-B044-96E204895EB9}" type="datetimeFigureOut">
               <a:rPr lang="en-US" smtClean="0"/>
-              <a:t>4/12/2022</a:t>
+              <a:t>4/14/2022</a:t>
             </a:fld>
             <a:endParaRPr lang="en-US"/>
           </a:p>
@@ -4461,7 +4466,7 @@
           <a:p>
             <a:fld id="{7C5B5309-B0EA-4A94-B044-96E204895EB9}" type="datetimeFigureOut">
               <a:rPr lang="en-US" smtClean="0"/>
-              <a:t>4/12/2022</a:t>
+              <a:t>4/14/2022</a:t>
             </a:fld>
             <a:endParaRPr lang="en-US"/>
           </a:p>
@@ -4556,7 +4561,7 @@
           <a:p>
             <a:fld id="{7C5B5309-B0EA-4A94-B044-96E204895EB9}" type="datetimeFigureOut">
               <a:rPr lang="en-US" smtClean="0"/>
-              <a:t>4/12/2022</a:t>
+              <a:t>4/14/2022</a:t>
             </a:fld>
             <a:endParaRPr lang="en-US"/>
           </a:p>
@@ -4811,7 +4816,7 @@
           <a:p>
             <a:fld id="{7C5B5309-B0EA-4A94-B044-96E204895EB9}" type="datetimeFigureOut">
               <a:rPr lang="en-US" smtClean="0"/>
-              <a:t>4/12/2022</a:t>
+              <a:t>4/14/2022</a:t>
             </a:fld>
             <a:endParaRPr lang="en-US"/>
           </a:p>
@@ -5111,7 +5116,7 @@
           <a:p>
             <a:fld id="{7C5B5309-B0EA-4A94-B044-96E204895EB9}" type="datetimeFigureOut">
               <a:rPr lang="en-US" smtClean="0"/>
-              <a:t>4/12/2022</a:t>
+              <a:t>4/14/2022</a:t>
             </a:fld>
             <a:endParaRPr lang="en-US"/>
           </a:p>
@@ -5345,7 +5350,7 @@
           <a:p>
             <a:fld id="{7C5B5309-B0EA-4A94-B044-96E204895EB9}" type="datetimeFigureOut">
               <a:rPr lang="en-US" smtClean="0"/>
-              <a:t>4/12/2022</a:t>
+              <a:t>4/14/2022</a:t>
             </a:fld>
             <a:endParaRPr lang="en-US"/>
           </a:p>
@@ -6364,8 +6369,8 @@
           </a:p>
         </p:txBody>
       </p:sp>
-      <mc:AlternateContent xmlns:mc="http://schemas.openxmlformats.org/markup-compatibility/2006">
-        <mc:Choice xmlns:a14="http://schemas.microsoft.com/office/drawing/2010/main" Requires="a14">
+      <mc:AlternateContent xmlns:mc="http://schemas.openxmlformats.org/markup-compatibility/2006" xmlns:a14="http://schemas.microsoft.com/office/drawing/2010/main">
+        <mc:Choice Requires="a14">
           <p:sp>
             <p:nvSpPr>
               <p:cNvPr id="3" name="Content Placeholder 2">
@@ -8548,7 +8553,7 @@
             </p:txBody>
           </p:sp>
         </mc:Choice>
-        <mc:Fallback>
+        <mc:Fallback xmlns="">
           <p:sp>
             <p:nvSpPr>
               <p:cNvPr id="3" name="Content Placeholder 2">
@@ -8592,8 +8597,8 @@
           </p:sp>
         </mc:Fallback>
       </mc:AlternateContent>
-      <mc:AlternateContent xmlns:mc="http://schemas.openxmlformats.org/markup-compatibility/2006">
-        <mc:Choice xmlns:a14="http://schemas.microsoft.com/office/drawing/2010/main" Requires="a14">
+      <mc:AlternateContent xmlns:mc="http://schemas.openxmlformats.org/markup-compatibility/2006" xmlns:a14="http://schemas.microsoft.com/office/drawing/2010/main">
+        <mc:Choice Requires="a14">
           <p:sp>
             <p:nvSpPr>
               <p:cNvPr id="5" name="Content Placeholder 2">
@@ -9798,7 +9803,7 @@
             </p:txBody>
           </p:sp>
         </mc:Choice>
-        <mc:Fallback>
+        <mc:Fallback xmlns="">
           <p:sp>
             <p:nvSpPr>
               <p:cNvPr id="5" name="Content Placeholder 2">
@@ -9925,12 +9930,52 @@
             <p:ph idx="1"/>
           </p:nvPr>
         </p:nvSpPr>
-        <p:spPr/>
-        <p:txBody>
-          <a:bodyPr/>
+        <p:spPr>
+          <a:xfrm>
+            <a:off x="919119" y="1844818"/>
+            <a:ext cx="10353762" cy="4403582"/>
+          </a:xfrm>
+        </p:spPr>
+        <p:txBody>
+          <a:bodyPr>
+            <a:normAutofit/>
+          </a:bodyPr>
           <a:lstStyle/>
           <a:p>
-            <a:endParaRPr lang="en-US"/>
+            <a:r>
+              <a:rPr lang="pt-PT" sz="1800" dirty="0"/>
+              <a:t>Para abordar um problema de IP (e também de MIP), o CPLEX aplica um algoritmo de Branch-and-cut que resolve uma série de subproblemas em LP.</a:t>
+            </a:r>
+          </a:p>
+          <a:p>
+            <a:pPr lvl="1"/>
+            <a:r>
+              <a:rPr lang="pt-PT" sz="1600" dirty="0"/>
+              <a:t>Este algoritmo aplica o método de Branch-and-bound, mas gerando cortes em ordem a fortificar a relaxação linear (torná-la numa melhor aproximação do MIP original).</a:t>
+            </a:r>
+          </a:p>
+          <a:p>
+            <a:pPr lvl="1"/>
+            <a:r>
+              <a:rPr lang="pt-PT" sz="1600" dirty="0"/>
+              <a:t>Estes cortes são restrições adicionadas ao modelo para restringir soluções não inteiras que poderiam ser soluções da relaxação. Isto normalmente conduz a uma redução do nº de ramos necessários para resolver o MIP.</a:t>
+            </a:r>
+          </a:p>
+          <a:p>
+            <a:endParaRPr lang="pt-PT" sz="1800" dirty="0"/>
+          </a:p>
+          <a:p>
+            <a:r>
+              <a:rPr lang="pt-PT" sz="1800" dirty="0"/>
+              <a:t>Para estes subproblemas de LP, o CPLEX tem vários algoritmos alternativos possíveis de aplicar. O mais comum é o algoritmo de dual simplex.</a:t>
+            </a:r>
+          </a:p>
+          <a:p>
+            <a:pPr lvl="1"/>
+            <a:r>
+              <a:rPr lang="pt-PT" sz="1600" dirty="0"/>
+              <a:t>O método de dual simplex segue o princípio do Teorema da Dualidade da Programação Linear, em que se transforma uma problema LP no seu dual, resolve-se esse novo problema, e a solução deste corresponde ao do problema original. </a:t>
+            </a:r>
           </a:p>
         </p:txBody>
       </p:sp>
@@ -10009,12 +10054,92 @@
             <p:ph idx="1"/>
           </p:nvPr>
         </p:nvSpPr>
-        <p:spPr/>
+        <p:spPr>
+          <a:xfrm>
+            <a:off x="913795" y="1732449"/>
+            <a:ext cx="10353762" cy="4702534"/>
+          </a:xfrm>
+        </p:spPr>
         <p:txBody>
           <a:bodyPr/>
           <a:lstStyle/>
           <a:p>
-            <a:endParaRPr lang="en-US"/>
+            <a:r>
+              <a:rPr lang="pt-PT" sz="1800" dirty="0"/>
+              <a:t>Complexidade Temporal:</a:t>
+            </a:r>
+          </a:p>
+          <a:p>
+            <a:pPr lvl="1"/>
+            <a:r>
+              <a:rPr lang="pt-PT" sz="1600" dirty="0"/>
+              <a:t>Este cenário corresponde a um problema de IP (Integer Programming), sendo então NP-complete. Isto significa que um solução pode ser verificada em tempo polinomial, mas que não existe uma forma “eficiente” de calcular uma solução, e portanto o tempo de execução do algoritmo aumenta rapidamente quanto maior o tamanho do input. Portanto, no presente, a complexidade temporal de problemas NP-complete é superpolinomial, O(n</a:t>
+            </a:r>
+            <a:r>
+              <a:rPr lang="pt-PT" sz="1600" baseline="30000" dirty="0"/>
+              <a:t>k</a:t>
+            </a:r>
+            <a:r>
+              <a:rPr lang="pt-PT" sz="1600" dirty="0"/>
+              <a:t>) com k &gt; 0.</a:t>
+            </a:r>
+          </a:p>
+          <a:p>
+            <a:endParaRPr lang="pt-PT" sz="1800" dirty="0"/>
+          </a:p>
+          <a:p>
+            <a:r>
+              <a:rPr lang="pt-PT" sz="1800" dirty="0"/>
+              <a:t>Complexidade Espacial:</a:t>
+            </a:r>
+          </a:p>
+          <a:p>
+            <a:pPr lvl="1"/>
+            <a:r>
+              <a:rPr lang="pt-PT" sz="1600" dirty="0"/>
+              <a:t>Sendo um problema de IP, também é altamente intensivo em termos de uso de memória. Não contando com variáveis criadas internamente pelo CPLEX aquando da aplicação do algoritmo, temos que:</a:t>
+            </a:r>
+          </a:p>
+          <a:p>
+            <a:pPr lvl="2"/>
+            <a:r>
+              <a:rPr lang="pt-PT" sz="1400" dirty="0"/>
+              <a:t>Nº variáveis de decisão: O(n + n * m) = O(n * m)</a:t>
+            </a:r>
+          </a:p>
+          <a:p>
+            <a:pPr lvl="2"/>
+            <a:r>
+              <a:rPr lang="pt-PT" sz="1400" dirty="0"/>
+              <a:t>Nº restrições: O(n + n * m + n * m) = O(n * m)</a:t>
+            </a:r>
+          </a:p>
+          <a:p>
+            <a:pPr lvl="1"/>
+            <a:r>
+              <a:rPr lang="pt-PT" sz="1600" dirty="0"/>
+              <a:t>Totalizando em O(n * m).</a:t>
+            </a:r>
+          </a:p>
+          <a:p>
+            <a:pPr lvl="2"/>
+            <a:endParaRPr lang="pt-PT" sz="1400" dirty="0"/>
+          </a:p>
+          <a:p>
+            <a:pPr lvl="1"/>
+            <a:endParaRPr lang="pt-PT" sz="1600" dirty="0"/>
+          </a:p>
+          <a:p>
+            <a:pPr marL="72900" indent="0">
+              <a:buNone/>
+            </a:pPr>
+            <a:endParaRPr lang="pt-PT" sz="1800" dirty="0"/>
+          </a:p>
+          <a:p>
+            <a:endParaRPr lang="pt-PT" dirty="0"/>
+          </a:p>
+          <a:p>
+            <a:endParaRPr lang="en-US" dirty="0"/>
           </a:p>
         </p:txBody>
       </p:sp>
@@ -10093,12 +10218,55 @@
             <p:ph idx="1"/>
           </p:nvPr>
         </p:nvSpPr>
-        <p:spPr/>
-        <p:txBody>
-          <a:bodyPr/>
+        <p:spPr>
+          <a:xfrm>
+            <a:off x="913795" y="1732449"/>
+            <a:ext cx="10353762" cy="4728172"/>
+          </a:xfrm>
+        </p:spPr>
+        <p:txBody>
+          <a:bodyPr>
+            <a:normAutofit/>
+          </a:bodyPr>
           <a:lstStyle/>
           <a:p>
-            <a:endParaRPr lang="en-US"/>
+            <a:r>
+              <a:rPr lang="pt-PT" sz="1800" dirty="0"/>
+              <a:t>Os dois testes de exemplo são pequenos e o CPLEX é capaz de gerar uma solução ótima muito rapidamente.</a:t>
+            </a:r>
+          </a:p>
+          <a:p>
+            <a:pPr lvl="1"/>
+            <a:r>
+              <a:rPr lang="pt-PT" sz="1600" dirty="0"/>
+              <a:t>O primeiro exemplo mostra a capacidade de calcular uma solução ótima.</a:t>
+            </a:r>
+          </a:p>
+          <a:p>
+            <a:pPr lvl="1"/>
+            <a:r>
+              <a:rPr lang="pt-PT" sz="1600" dirty="0"/>
+              <a:t>O segundo mostra que o algoritmo não permite lucros negativos, preferindo não entregar nenhuma encomenda se não for possível obter lucro.</a:t>
+            </a:r>
+          </a:p>
+          <a:p>
+            <a:endParaRPr lang="pt-PT" sz="1800" dirty="0"/>
+          </a:p>
+          <a:p>
+            <a:r>
+              <a:rPr lang="pt-PT" sz="1800" dirty="0"/>
+              <a:t>Quanto ao teste aleatório, dá para observar a diferença no tempo de execução quando é gerado um pequeno subconjunto de dados em contraste com a geração de um maior conjunto de dados. Porém, mesmo no pior caso, o tempo de execução não é muito longo, nunca excedendo 1-2 minutos.</a:t>
+            </a:r>
+          </a:p>
+          <a:p>
+            <a:endParaRPr lang="pt-PT" sz="1800" dirty="0"/>
+          </a:p>
+          <a:p>
+            <a:r>
+              <a:rPr lang="pt-PT" sz="1800" dirty="0"/>
+              <a:t>No entanto, com o dataset original dado pelo guião, ao fim de 10 minutos o CPLEX ainda não tinha gerado uma solução, o que mostra a elevada complexidade temporal deste tipo de problemas e o quão rapidamente o tempo de execução aumenta consoante o tamanho do input.</a:t>
+            </a:r>
+            <a:endParaRPr lang="en-US" sz="1800" dirty="0"/>
           </a:p>
         </p:txBody>
       </p:sp>

</xml_diff>

<commit_message>
Fixed console menu input bug
</commit_message>
<xml_diff>
--- a/Presentation.pptx
+++ b/Presentation.pptx
@@ -302,7 +302,7 @@
           <a:p>
             <a:fld id="{7C5B5309-B0EA-4A94-B044-96E204895EB9}" type="datetimeFigureOut">
               <a:rPr lang="en-US" smtClean="0"/>
-              <a:t>4/14/2022</a:t>
+              <a:t>4/15/2022</a:t>
             </a:fld>
             <a:endParaRPr lang="en-US"/>
           </a:p>
@@ -600,7 +600,7 @@
           <a:p>
             <a:fld id="{7C5B5309-B0EA-4A94-B044-96E204895EB9}" type="datetimeFigureOut">
               <a:rPr lang="en-US" smtClean="0"/>
-              <a:t>4/14/2022</a:t>
+              <a:t>4/15/2022</a:t>
             </a:fld>
             <a:endParaRPr lang="en-US"/>
           </a:p>
@@ -792,7 +792,7 @@
           <a:p>
             <a:fld id="{7C5B5309-B0EA-4A94-B044-96E204895EB9}" type="datetimeFigureOut">
               <a:rPr lang="en-US" smtClean="0"/>
-              <a:t>4/14/2022</a:t>
+              <a:t>4/15/2022</a:t>
             </a:fld>
             <a:endParaRPr lang="en-US"/>
           </a:p>
@@ -1053,7 +1053,7 @@
           <a:p>
             <a:fld id="{7C5B5309-B0EA-4A94-B044-96E204895EB9}" type="datetimeFigureOut">
               <a:rPr lang="en-US" smtClean="0"/>
-              <a:t>4/14/2022</a:t>
+              <a:t>4/15/2022</a:t>
             </a:fld>
             <a:endParaRPr lang="en-US"/>
           </a:p>
@@ -1477,7 +1477,7 @@
           <a:p>
             <a:fld id="{7C5B5309-B0EA-4A94-B044-96E204895EB9}" type="datetimeFigureOut">
               <a:rPr lang="en-US" smtClean="0"/>
-              <a:t>4/14/2022</a:t>
+              <a:t>4/15/2022</a:t>
             </a:fld>
             <a:endParaRPr lang="en-US"/>
           </a:p>
@@ -2014,7 +2014,7 @@
           <a:p>
             <a:fld id="{7C5B5309-B0EA-4A94-B044-96E204895EB9}" type="datetimeFigureOut">
               <a:rPr lang="en-US" smtClean="0"/>
-              <a:t>4/14/2022</a:t>
+              <a:t>4/15/2022</a:t>
             </a:fld>
             <a:endParaRPr lang="en-US"/>
           </a:p>
@@ -2878,7 +2878,7 @@
           <a:p>
             <a:fld id="{7C5B5309-B0EA-4A94-B044-96E204895EB9}" type="datetimeFigureOut">
               <a:rPr lang="en-US" smtClean="0"/>
-              <a:t>4/14/2022</a:t>
+              <a:t>4/15/2022</a:t>
             </a:fld>
             <a:endParaRPr lang="en-US"/>
           </a:p>
@@ -3048,7 +3048,7 @@
           <a:p>
             <a:fld id="{7C5B5309-B0EA-4A94-B044-96E204895EB9}" type="datetimeFigureOut">
               <a:rPr lang="en-US" smtClean="0"/>
-              <a:t>4/14/2022</a:t>
+              <a:t>4/15/2022</a:t>
             </a:fld>
             <a:endParaRPr lang="en-US"/>
           </a:p>
@@ -3232,7 +3232,7 @@
           <a:p>
             <a:fld id="{7C5B5309-B0EA-4A94-B044-96E204895EB9}" type="datetimeFigureOut">
               <a:rPr lang="en-US" smtClean="0"/>
-              <a:t>4/14/2022</a:t>
+              <a:t>4/15/2022</a:t>
             </a:fld>
             <a:endParaRPr lang="en-US"/>
           </a:p>
@@ -3402,7 +3402,7 @@
           <a:p>
             <a:fld id="{7C5B5309-B0EA-4A94-B044-96E204895EB9}" type="datetimeFigureOut">
               <a:rPr lang="en-US" smtClean="0"/>
-              <a:t>4/14/2022</a:t>
+              <a:t>4/15/2022</a:t>
             </a:fld>
             <a:endParaRPr lang="en-US"/>
           </a:p>
@@ -3646,7 +3646,7 @@
           <a:p>
             <a:fld id="{7C5B5309-B0EA-4A94-B044-96E204895EB9}" type="datetimeFigureOut">
               <a:rPr lang="en-US" smtClean="0"/>
-              <a:t>4/14/2022</a:t>
+              <a:t>4/15/2022</a:t>
             </a:fld>
             <a:endParaRPr lang="en-US"/>
           </a:p>
@@ -3882,7 +3882,7 @@
           <a:p>
             <a:fld id="{7C5B5309-B0EA-4A94-B044-96E204895EB9}" type="datetimeFigureOut">
               <a:rPr lang="en-US" smtClean="0"/>
-              <a:t>4/14/2022</a:t>
+              <a:t>4/15/2022</a:t>
             </a:fld>
             <a:endParaRPr lang="en-US"/>
           </a:p>
@@ -4348,7 +4348,7 @@
           <a:p>
             <a:fld id="{7C5B5309-B0EA-4A94-B044-96E204895EB9}" type="datetimeFigureOut">
               <a:rPr lang="en-US" smtClean="0"/>
-              <a:t>4/14/2022</a:t>
+              <a:t>4/15/2022</a:t>
             </a:fld>
             <a:endParaRPr lang="en-US"/>
           </a:p>
@@ -4466,7 +4466,7 @@
           <a:p>
             <a:fld id="{7C5B5309-B0EA-4A94-B044-96E204895EB9}" type="datetimeFigureOut">
               <a:rPr lang="en-US" smtClean="0"/>
-              <a:t>4/14/2022</a:t>
+              <a:t>4/15/2022</a:t>
             </a:fld>
             <a:endParaRPr lang="en-US"/>
           </a:p>
@@ -4561,7 +4561,7 @@
           <a:p>
             <a:fld id="{7C5B5309-B0EA-4A94-B044-96E204895EB9}" type="datetimeFigureOut">
               <a:rPr lang="en-US" smtClean="0"/>
-              <a:t>4/14/2022</a:t>
+              <a:t>4/15/2022</a:t>
             </a:fld>
             <a:endParaRPr lang="en-US"/>
           </a:p>
@@ -4816,7 +4816,7 @@
           <a:p>
             <a:fld id="{7C5B5309-B0EA-4A94-B044-96E204895EB9}" type="datetimeFigureOut">
               <a:rPr lang="en-US" smtClean="0"/>
-              <a:t>4/14/2022</a:t>
+              <a:t>4/15/2022</a:t>
             </a:fld>
             <a:endParaRPr lang="en-US"/>
           </a:p>
@@ -5116,7 +5116,7 @@
           <a:p>
             <a:fld id="{7C5B5309-B0EA-4A94-B044-96E204895EB9}" type="datetimeFigureOut">
               <a:rPr lang="en-US" smtClean="0"/>
-              <a:t>4/14/2022</a:t>
+              <a:t>4/15/2022</a:t>
             </a:fld>
             <a:endParaRPr lang="en-US"/>
           </a:p>
@@ -5350,7 +5350,7 @@
           <a:p>
             <a:fld id="{7C5B5309-B0EA-4A94-B044-96E204895EB9}" type="datetimeFigureOut">
               <a:rPr lang="en-US" smtClean="0"/>
-              <a:t>4/14/2022</a:t>
+              <a:t>4/15/2022</a:t>
             </a:fld>
             <a:endParaRPr lang="en-US"/>
           </a:p>
@@ -6369,8 +6369,8 @@
           </a:p>
         </p:txBody>
       </p:sp>
-      <mc:AlternateContent xmlns:mc="http://schemas.openxmlformats.org/markup-compatibility/2006" xmlns:a14="http://schemas.microsoft.com/office/drawing/2010/main">
-        <mc:Choice Requires="a14">
+      <mc:AlternateContent xmlns:mc="http://schemas.openxmlformats.org/markup-compatibility/2006">
+        <mc:Choice xmlns:a14="http://schemas.microsoft.com/office/drawing/2010/main" Requires="a14">
           <p:sp>
             <p:nvSpPr>
               <p:cNvPr id="3" name="Content Placeholder 2">
@@ -7574,8 +7574,22 @@
                           </a:outerShdw>
                         </a:effectLst>
                         <a:latin typeface="Cambria Math" panose="02040503050406030204" pitchFamily="18" charset="0"/>
+                        <a:ea typeface="Cambria Math" panose="02040503050406030204" pitchFamily="18" charset="0"/>
                       </a:rPr>
-                      <m:t>&lt;=1,  </m:t>
+                      <m:t>≤</m:t>
+                    </m:r>
+                    <m:r>
+                      <a:rPr lang="pt-PT" sz="1600" b="0" i="1" smtClean="0">
+                        <a:effectLst>
+                          <a:outerShdw blurRad="38100" dist="38100" dir="2700000" algn="tl">
+                            <a:srgbClr val="000000">
+                              <a:alpha val="43137"/>
+                            </a:srgbClr>
+                          </a:outerShdw>
+                        </a:effectLst>
+                        <a:latin typeface="Cambria Math" panose="02040503050406030204" pitchFamily="18" charset="0"/>
+                      </a:rPr>
+                      <m:t>1,  </m:t>
                     </m:r>
                     <m:r>
                       <a:rPr lang="pt-PT" sz="1600" b="0" i="1" smtClean="0">
@@ -8553,7 +8567,7 @@
             </p:txBody>
           </p:sp>
         </mc:Choice>
-        <mc:Fallback xmlns="">
+        <mc:Fallback>
           <p:sp>
             <p:nvSpPr>
               <p:cNvPr id="3" name="Content Placeholder 2">
@@ -8597,8 +8611,8 @@
           </p:sp>
         </mc:Fallback>
       </mc:AlternateContent>
-      <mc:AlternateContent xmlns:mc="http://schemas.openxmlformats.org/markup-compatibility/2006" xmlns:a14="http://schemas.microsoft.com/office/drawing/2010/main">
-        <mc:Choice Requires="a14">
+      <mc:AlternateContent xmlns:mc="http://schemas.openxmlformats.org/markup-compatibility/2006">
+        <mc:Choice xmlns:a14="http://schemas.microsoft.com/office/drawing/2010/main" Requires="a14">
           <p:sp>
             <p:nvSpPr>
               <p:cNvPr id="5" name="Content Placeholder 2">
@@ -9357,6 +9371,19 @@
                 <a:pPr lvl="1"/>
                 <a14:m>
                   <m:oMath xmlns:m="http://schemas.openxmlformats.org/officeDocument/2006/math">
+                    <m:r>
+                      <a:rPr lang="pt-PT" sz="1600" b="0" i="1" smtClean="0">
+                        <a:effectLst>
+                          <a:outerShdw blurRad="38100" dist="38100" dir="2700000" algn="tl">
+                            <a:srgbClr val="000000">
+                              <a:alpha val="43137"/>
+                            </a:srgbClr>
+                          </a:outerShdw>
+                        </a:effectLst>
+                        <a:latin typeface="Cambria Math" panose="02040503050406030204" pitchFamily="18" charset="0"/>
+                      </a:rPr>
+                      <m:t>𝑚𝑎𝑥</m:t>
+                    </m:r>
                     <m:nary>
                       <m:naryPr>
                         <m:chr m:val="∑"/>
@@ -9803,7 +9830,7 @@
             </p:txBody>
           </p:sp>
         </mc:Choice>
-        <mc:Fallback xmlns="">
+        <mc:Fallback>
           <p:sp>
             <p:nvSpPr>
               <p:cNvPr id="5" name="Content Placeholder 2">
@@ -10232,7 +10259,7 @@
           <a:p>
             <a:r>
               <a:rPr lang="pt-PT" sz="1800" dirty="0"/>
-              <a:t>Os dois testes de exemplo são pequenos e o CPLEX é capaz de gerar uma solução ótima muito rapidamente.</a:t>
+              <a:t>Os dois testes de exemplo são pequenos e o CPLEX é capaz de gerar uma solução ótima em pouco tempo.</a:t>
             </a:r>
           </a:p>
           <a:p>

</xml_diff>